<commit_message>
added images for readme
</commit_message>
<xml_diff>
--- a/dsc-capstone-project-presentation.pptx
+++ b/dsc-capstone-project-presentation.pptx
@@ -2,7 +2,7 @@
 <file path=ppt/presentation.xml><?xml version="1.0" encoding="utf-8"?>
 <p:presentation xmlns:a="http://schemas.openxmlformats.org/drawingml/2006/main" xmlns:r="http://schemas.openxmlformats.org/officeDocument/2006/relationships" xmlns:p="http://schemas.openxmlformats.org/presentationml/2006/main" autoCompressPictures="0">
   <p:sldMasterIdLst>
-    <p:sldMasterId id="2147483648" r:id="rId1"/>
+    <p:sldMasterId id="2147484329" r:id="rId1"/>
   </p:sldMasterIdLst>
   <p:sldIdLst>
     <p:sldId id="256" r:id="rId2"/>
@@ -1066,7 +1066,7 @@
           </a:pPr>
           <a:r>
             <a:rPr lang="en-US" dirty="0"/>
-            <a:t>Consider allocating resources towards creation of album art </a:t>
+            <a:t>Consider not spending time and money towards creation of album art </a:t>
           </a:r>
         </a:p>
       </dgm:t>
@@ -1509,7 +1509,7 @@
           </a:pPr>
           <a:r>
             <a:rPr lang="en-US" sz="2500" kern="1200" dirty="0"/>
-            <a:t>Consider allocating resources towards creation of album art </a:t>
+            <a:t>Consider not spending time and money towards creation of album art </a:t>
           </a:r>
         </a:p>
       </dsp:txBody>
@@ -3405,9 +3405,9 @@
           </a:lstStyle>
           <a:p>
             <a:fld id="{B61BEF0D-F0BB-DE4B-95CE-6DB70DBA9567}" type="datetimeFigureOut">
-              <a:rPr lang="en-US" dirty="0"/>
+              <a:rPr lang="en-US" smtClean="0"/>
               <a:pPr/>
-              <a:t>9/23/22</a:t>
+              <a:t>10/2/22</a:t>
             </a:fld>
             <a:endParaRPr lang="en-US" dirty="0"/>
           </a:p>
@@ -3480,7 +3480,7 @@
           </a:lstStyle>
           <a:p>
             <a:fld id="{D57F1E4F-1CFF-5643-939E-217C01CDF565}" type="slidenum">
-              <a:rPr lang="en-US" dirty="0"/>
+              <a:rPr lang="en-US" smtClean="0"/>
               <a:pPr/>
               <a:t>‹#›</a:t>
             </a:fld>
@@ -3489,6 +3489,11 @@
         </p:txBody>
       </p:sp>
     </p:spTree>
+    <p:extLst>
+      <p:ext uri="{BB962C8B-B14F-4D97-AF65-F5344CB8AC3E}">
+        <p14:creationId xmlns:p14="http://schemas.microsoft.com/office/powerpoint/2010/main" val="483464490"/>
+      </p:ext>
+    </p:extLst>
   </p:cSld>
   <p:clrMapOvr>
     <a:masterClrMapping/>
@@ -3664,9 +3669,9 @@
           <a:lstStyle/>
           <a:p>
             <a:fld id="{B61BEF0D-F0BB-DE4B-95CE-6DB70DBA9567}" type="datetimeFigureOut">
-              <a:rPr lang="en-US" dirty="0"/>
+              <a:rPr lang="en-US" smtClean="0"/>
               <a:pPr/>
-              <a:t>9/23/22</a:t>
+              <a:t>10/2/22</a:t>
             </a:fld>
             <a:endParaRPr lang="en-US" dirty="0"/>
           </a:p>
@@ -3707,7 +3712,7 @@
           <a:lstStyle/>
           <a:p>
             <a:fld id="{D57F1E4F-1CFF-5643-939E-217C01CDF565}" type="slidenum">
-              <a:rPr lang="en-US" dirty="0"/>
+              <a:rPr lang="en-US" smtClean="0"/>
               <a:pPr/>
               <a:t>‹#›</a:t>
             </a:fld>
@@ -3716,6 +3721,11 @@
         </p:txBody>
       </p:sp>
     </p:spTree>
+    <p:extLst>
+      <p:ext uri="{BB962C8B-B14F-4D97-AF65-F5344CB8AC3E}">
+        <p14:creationId xmlns:p14="http://schemas.microsoft.com/office/powerpoint/2010/main" val="3737737266"/>
+      </p:ext>
+    </p:extLst>
   </p:cSld>
   <p:clrMapOvr>
     <a:masterClrMapping/>
@@ -3896,9 +3906,9 @@
           </a:lstStyle>
           <a:p>
             <a:fld id="{B61BEF0D-F0BB-DE4B-95CE-6DB70DBA9567}" type="datetimeFigureOut">
-              <a:rPr lang="en-US" dirty="0"/>
+              <a:rPr lang="en-US" smtClean="0"/>
               <a:pPr/>
-              <a:t>9/23/22</a:t>
+              <a:t>10/2/22</a:t>
             </a:fld>
             <a:endParaRPr lang="en-US" dirty="0"/>
           </a:p>
@@ -3960,7 +3970,7 @@
           </a:lstStyle>
           <a:p>
             <a:fld id="{D57F1E4F-1CFF-5643-939E-217C01CDF565}" type="slidenum">
-              <a:rPr lang="en-US" dirty="0"/>
+              <a:rPr lang="en-US" smtClean="0"/>
               <a:pPr/>
               <a:t>‹#›</a:t>
             </a:fld>
@@ -3969,6 +3979,11 @@
         </p:txBody>
       </p:sp>
     </p:spTree>
+    <p:extLst>
+      <p:ext uri="{BB962C8B-B14F-4D97-AF65-F5344CB8AC3E}">
+        <p14:creationId xmlns:p14="http://schemas.microsoft.com/office/powerpoint/2010/main" val="2927397138"/>
+      </p:ext>
+    </p:extLst>
   </p:cSld>
   <p:clrMapOvr>
     <a:masterClrMapping/>
@@ -4133,9 +4148,9 @@
           <a:lstStyle/>
           <a:p>
             <a:fld id="{B61BEF0D-F0BB-DE4B-95CE-6DB70DBA9567}" type="datetimeFigureOut">
-              <a:rPr lang="en-US" dirty="0"/>
+              <a:rPr lang="en-US" smtClean="0"/>
               <a:pPr/>
-              <a:t>9/23/22</a:t>
+              <a:t>10/2/22</a:t>
             </a:fld>
             <a:endParaRPr lang="en-US" dirty="0"/>
           </a:p>
@@ -4181,7 +4196,7 @@
           <a:lstStyle/>
           <a:p>
             <a:fld id="{D57F1E4F-1CFF-5643-939E-217C01CDF565}" type="slidenum">
-              <a:rPr lang="en-US" dirty="0"/>
+              <a:rPr lang="en-US" smtClean="0"/>
               <a:pPr/>
               <a:t>‹#›</a:t>
             </a:fld>
@@ -4190,6 +4205,11 @@
         </p:txBody>
       </p:sp>
     </p:spTree>
+    <p:extLst>
+      <p:ext uri="{BB962C8B-B14F-4D97-AF65-F5344CB8AC3E}">
+        <p14:creationId xmlns:p14="http://schemas.microsoft.com/office/powerpoint/2010/main" val="2886015212"/>
+      </p:ext>
+    </p:extLst>
   </p:cSld>
   <p:clrMapOvr>
     <a:masterClrMapping/>
@@ -4437,9 +4457,9 @@
           </a:lstStyle>
           <a:p>
             <a:fld id="{B61BEF0D-F0BB-DE4B-95CE-6DB70DBA9567}" type="datetimeFigureOut">
-              <a:rPr lang="en-US" dirty="0"/>
+              <a:rPr lang="en-US" smtClean="0"/>
               <a:pPr/>
-              <a:t>9/23/22</a:t>
+              <a:t>10/2/22</a:t>
             </a:fld>
             <a:endParaRPr lang="en-US" dirty="0"/>
           </a:p>
@@ -4502,7 +4522,7 @@
           </a:lstStyle>
           <a:p>
             <a:fld id="{D57F1E4F-1CFF-5643-939E-217C01CDF565}" type="slidenum">
-              <a:rPr lang="en-US" dirty="0"/>
+              <a:rPr lang="en-US" smtClean="0"/>
               <a:pPr/>
               <a:t>‹#›</a:t>
             </a:fld>
@@ -4511,6 +4531,11 @@
         </p:txBody>
       </p:sp>
     </p:spTree>
+    <p:extLst>
+      <p:ext uri="{BB962C8B-B14F-4D97-AF65-F5344CB8AC3E}">
+        <p14:creationId xmlns:p14="http://schemas.microsoft.com/office/powerpoint/2010/main" val="2924622135"/>
+      </p:ext>
+    </p:extLst>
   </p:cSld>
   <p:clrMapOvr>
     <a:masterClrMapping/>
@@ -4736,9 +4761,9 @@
           <a:lstStyle/>
           <a:p>
             <a:fld id="{B61BEF0D-F0BB-DE4B-95CE-6DB70DBA9567}" type="datetimeFigureOut">
-              <a:rPr lang="en-US" dirty="0"/>
+              <a:rPr lang="en-US" smtClean="0"/>
               <a:pPr/>
-              <a:t>9/23/22</a:t>
+              <a:t>10/2/22</a:t>
             </a:fld>
             <a:endParaRPr lang="en-US" dirty="0"/>
           </a:p>
@@ -4779,7 +4804,7 @@
           <a:lstStyle/>
           <a:p>
             <a:fld id="{D57F1E4F-1CFF-5643-939E-217C01CDF565}" type="slidenum">
-              <a:rPr lang="en-US" dirty="0"/>
+              <a:rPr lang="en-US" smtClean="0"/>
               <a:pPr/>
               <a:t>‹#›</a:t>
             </a:fld>
@@ -4788,10 +4813,20 @@
         </p:txBody>
       </p:sp>
     </p:spTree>
+    <p:extLst>
+      <p:ext uri="{BB962C8B-B14F-4D97-AF65-F5344CB8AC3E}">
+        <p14:creationId xmlns:p14="http://schemas.microsoft.com/office/powerpoint/2010/main" val="827098903"/>
+      </p:ext>
+    </p:extLst>
   </p:cSld>
   <p:clrMapOvr>
     <a:masterClrMapping/>
   </p:clrMapOvr>
+  <p:extLst>
+    <p:ext uri="{DCECCB84-F9BA-43D5-87BE-67443E8EF086}">
+      <p15:sldGuideLst xmlns:p15="http://schemas.microsoft.com/office/powerpoint/2012/main"/>
+    </p:ext>
+  </p:extLst>
 </p:sldLayout>
 </file>
 
@@ -5155,9 +5190,9 @@
           <a:lstStyle/>
           <a:p>
             <a:fld id="{B61BEF0D-F0BB-DE4B-95CE-6DB70DBA9567}" type="datetimeFigureOut">
-              <a:rPr lang="en-US" dirty="0"/>
+              <a:rPr lang="en-US" smtClean="0"/>
               <a:pPr/>
-              <a:t>9/23/22</a:t>
+              <a:t>10/2/22</a:t>
             </a:fld>
             <a:endParaRPr lang="en-US" dirty="0"/>
           </a:p>
@@ -5198,7 +5233,7 @@
           <a:lstStyle/>
           <a:p>
             <a:fld id="{D57F1E4F-1CFF-5643-939E-217C01CDF565}" type="slidenum">
-              <a:rPr lang="en-US" dirty="0"/>
+              <a:rPr lang="en-US" smtClean="0"/>
               <a:pPr/>
               <a:t>‹#›</a:t>
             </a:fld>
@@ -5207,6 +5242,11 @@
         </p:txBody>
       </p:sp>
     </p:spTree>
+    <p:extLst>
+      <p:ext uri="{BB962C8B-B14F-4D97-AF65-F5344CB8AC3E}">
+        <p14:creationId xmlns:p14="http://schemas.microsoft.com/office/powerpoint/2010/main" val="1192673271"/>
+      </p:ext>
+    </p:extLst>
   </p:cSld>
   <p:clrMapOvr>
     <a:masterClrMapping/>
@@ -5314,9 +5354,9 @@
           <a:lstStyle/>
           <a:p>
             <a:fld id="{B61BEF0D-F0BB-DE4B-95CE-6DB70DBA9567}" type="datetimeFigureOut">
-              <a:rPr lang="en-US" dirty="0"/>
+              <a:rPr lang="en-US" smtClean="0"/>
               <a:pPr/>
-              <a:t>9/23/22</a:t>
+              <a:t>10/2/22</a:t>
             </a:fld>
             <a:endParaRPr lang="en-US" dirty="0"/>
           </a:p>
@@ -5357,7 +5397,7 @@
           <a:lstStyle/>
           <a:p>
             <a:fld id="{D57F1E4F-1CFF-5643-939E-217C01CDF565}" type="slidenum">
-              <a:rPr lang="en-US" dirty="0"/>
+              <a:rPr lang="en-US" smtClean="0"/>
               <a:pPr/>
               <a:t>‹#›</a:t>
             </a:fld>
@@ -5366,6 +5406,11 @@
         </p:txBody>
       </p:sp>
     </p:spTree>
+    <p:extLst>
+      <p:ext uri="{BB962C8B-B14F-4D97-AF65-F5344CB8AC3E}">
+        <p14:creationId xmlns:p14="http://schemas.microsoft.com/office/powerpoint/2010/main" val="3172083368"/>
+      </p:ext>
+    </p:extLst>
   </p:cSld>
   <p:clrMapOvr>
     <a:masterClrMapping/>
@@ -5406,9 +5451,9 @@
           <a:lstStyle/>
           <a:p>
             <a:fld id="{B61BEF0D-F0BB-DE4B-95CE-6DB70DBA9567}" type="datetimeFigureOut">
-              <a:rPr lang="en-US" dirty="0"/>
+              <a:rPr lang="en-US" smtClean="0"/>
               <a:pPr/>
-              <a:t>9/23/22</a:t>
+              <a:t>10/2/22</a:t>
             </a:fld>
             <a:endParaRPr lang="en-US" dirty="0"/>
           </a:p>
@@ -5449,7 +5494,7 @@
           <a:lstStyle/>
           <a:p>
             <a:fld id="{D57F1E4F-1CFF-5643-939E-217C01CDF565}" type="slidenum">
-              <a:rPr lang="en-US" dirty="0"/>
+              <a:rPr lang="en-US" smtClean="0"/>
               <a:pPr/>
               <a:t>‹#›</a:t>
             </a:fld>
@@ -5458,6 +5503,11 @@
         </p:txBody>
       </p:sp>
     </p:spTree>
+    <p:extLst>
+      <p:ext uri="{BB962C8B-B14F-4D97-AF65-F5344CB8AC3E}">
+        <p14:creationId xmlns:p14="http://schemas.microsoft.com/office/powerpoint/2010/main" val="99768208"/>
+      </p:ext>
+    </p:extLst>
   </p:cSld>
   <p:clrMapOvr>
     <a:masterClrMapping/>
@@ -5781,9 +5831,9 @@
           </a:lstStyle>
           <a:p>
             <a:fld id="{B61BEF0D-F0BB-DE4B-95CE-6DB70DBA9567}" type="datetimeFigureOut">
-              <a:rPr lang="en-US" dirty="0"/>
+              <a:rPr lang="en-US" smtClean="0"/>
               <a:pPr/>
-              <a:t>9/23/22</a:t>
+              <a:t>10/2/22</a:t>
             </a:fld>
             <a:endParaRPr lang="en-US" dirty="0"/>
           </a:p>
@@ -5846,7 +5896,7 @@
           </a:lstStyle>
           <a:p>
             <a:fld id="{D57F1E4F-1CFF-5643-939E-217C01CDF565}" type="slidenum">
-              <a:rPr lang="en-US" dirty="0"/>
+              <a:rPr lang="en-US" smtClean="0"/>
               <a:pPr/>
               <a:t>‹#›</a:t>
             </a:fld>
@@ -5855,10 +5905,20 @@
         </p:txBody>
       </p:sp>
     </p:spTree>
+    <p:extLst>
+      <p:ext uri="{BB962C8B-B14F-4D97-AF65-F5344CB8AC3E}">
+        <p14:creationId xmlns:p14="http://schemas.microsoft.com/office/powerpoint/2010/main" val="2728799503"/>
+      </p:ext>
+    </p:extLst>
   </p:cSld>
   <p:clrMapOvr>
     <a:masterClrMapping/>
   </p:clrMapOvr>
+  <p:extLst>
+    <p:ext uri="{DCECCB84-F9BA-43D5-87BE-67443E8EF086}">
+      <p15:sldGuideLst xmlns:p15="http://schemas.microsoft.com/office/powerpoint/2012/main"/>
+    </p:ext>
+  </p:extLst>
 </p:sldLayout>
 </file>
 
@@ -6067,9 +6127,9 @@
           <a:lstStyle/>
           <a:p>
             <a:fld id="{B61BEF0D-F0BB-DE4B-95CE-6DB70DBA9567}" type="datetimeFigureOut">
-              <a:rPr lang="en-US" dirty="0"/>
+              <a:rPr lang="en-US" smtClean="0"/>
               <a:pPr/>
-              <a:t>9/23/22</a:t>
+              <a:t>10/2/22</a:t>
             </a:fld>
             <a:endParaRPr lang="en-US" dirty="0"/>
           </a:p>
@@ -6110,7 +6170,7 @@
           <a:lstStyle/>
           <a:p>
             <a:fld id="{D57F1E4F-1CFF-5643-939E-217C01CDF565}" type="slidenum">
-              <a:rPr lang="en-US" dirty="0"/>
+              <a:rPr lang="en-US" smtClean="0"/>
               <a:pPr/>
               <a:t>‹#›</a:t>
             </a:fld>
@@ -6119,6 +6179,11 @@
         </p:txBody>
       </p:sp>
     </p:spTree>
+    <p:extLst>
+      <p:ext uri="{BB962C8B-B14F-4D97-AF65-F5344CB8AC3E}">
+        <p14:creationId xmlns:p14="http://schemas.microsoft.com/office/powerpoint/2010/main" val="477905156"/>
+      </p:ext>
+    </p:extLst>
   </p:cSld>
   <p:clrMapOvr>
     <a:masterClrMapping/>
@@ -6275,9 +6340,9 @@
           </a:lstStyle>
           <a:p>
             <a:fld id="{B61BEF0D-F0BB-DE4B-95CE-6DB70DBA9567}" type="datetimeFigureOut">
-              <a:rPr lang="en-US" dirty="0"/>
+              <a:rPr lang="en-US" smtClean="0"/>
               <a:pPr/>
-              <a:t>9/23/22</a:t>
+              <a:t>10/2/22</a:t>
             </a:fld>
             <a:endParaRPr lang="en-US" dirty="0"/>
           </a:p>
@@ -6350,7 +6415,7 @@
           </a:lstStyle>
           <a:p>
             <a:fld id="{D57F1E4F-1CFF-5643-939E-217C01CDF565}" type="slidenum">
-              <a:rPr lang="en-US" dirty="0"/>
+              <a:rPr lang="en-US" smtClean="0"/>
               <a:pPr/>
               <a:t>‹#›</a:t>
             </a:fld>
@@ -6470,20 +6535,25 @@
         </p:style>
       </p:sp>
     </p:spTree>
+    <p:extLst>
+      <p:ext uri="{BB962C8B-B14F-4D97-AF65-F5344CB8AC3E}">
+        <p14:creationId xmlns:p14="http://schemas.microsoft.com/office/powerpoint/2010/main" val="504653829"/>
+      </p:ext>
+    </p:extLst>
   </p:cSld>
   <p:clrMap bg1="lt1" tx1="dk1" bg2="lt2" tx2="dk2" accent1="accent1" accent2="accent2" accent3="accent3" accent4="accent4" accent5="accent5" accent6="accent6" hlink="hlink" folHlink="folHlink"/>
   <p:sldLayoutIdLst>
-    <p:sldLayoutId id="2147483649" r:id="rId1"/>
-    <p:sldLayoutId id="2147483650" r:id="rId2"/>
-    <p:sldLayoutId id="2147483651" r:id="rId3"/>
-    <p:sldLayoutId id="2147483652" r:id="rId4"/>
-    <p:sldLayoutId id="2147483653" r:id="rId5"/>
-    <p:sldLayoutId id="2147483654" r:id="rId6"/>
-    <p:sldLayoutId id="2147483655" r:id="rId7"/>
-    <p:sldLayoutId id="2147483656" r:id="rId8"/>
-    <p:sldLayoutId id="2147483657" r:id="rId9"/>
-    <p:sldLayoutId id="2147483658" r:id="rId10"/>
-    <p:sldLayoutId id="2147483659" r:id="rId11"/>
+    <p:sldLayoutId id="2147484330" r:id="rId1"/>
+    <p:sldLayoutId id="2147484331" r:id="rId2"/>
+    <p:sldLayoutId id="2147484332" r:id="rId3"/>
+    <p:sldLayoutId id="2147484333" r:id="rId4"/>
+    <p:sldLayoutId id="2147484334" r:id="rId5"/>
+    <p:sldLayoutId id="2147484335" r:id="rId6"/>
+    <p:sldLayoutId id="2147484336" r:id="rId7"/>
+    <p:sldLayoutId id="2147484337" r:id="rId8"/>
+    <p:sldLayoutId id="2147484338" r:id="rId9"/>
+    <p:sldLayoutId id="2147484339" r:id="rId10"/>
+    <p:sldLayoutId id="2147484340" r:id="rId11"/>
   </p:sldLayoutIdLst>
   <p:txStyles>
     <p:titleStyle>
@@ -6854,6 +6924,11 @@
       </a:lvl9pPr>
     </p:otherStyle>
   </p:txStyles>
+  <p:extLst>
+    <p:ext uri="{27BBF7A9-308A-43DC-89C8-2F10F3537804}">
+      <p15:sldGuideLst xmlns:p15="http://schemas.microsoft.com/office/powerpoint/2012/main"/>
+    </p:ext>
+  </p:extLst>
 </p:sldMaster>
 </file>
 
@@ -6884,10 +6959,10 @@
       </p:grpSpPr>
       <p:sp useBgFill="1">
         <p:nvSpPr>
-          <p:cNvPr id="76" name="Rectangle 75">
+          <p:cNvPr id="19" name="Rectangle 7">
             <a:extLst>
               <a:ext uri="{FF2B5EF4-FFF2-40B4-BE49-F238E27FC236}">
-                <a16:creationId xmlns:a16="http://schemas.microsoft.com/office/drawing/2014/main" id="{B5D795CF-5F70-4821-BB11-0B2B8FCCD45A}"/>
+                <a16:creationId xmlns:a16="http://schemas.microsoft.com/office/drawing/2014/main" id="{DA182162-B517-4B41-B039-339F87FAE1D0}"/>
               </a:ext>
               <a:ext uri="{C183D7F6-B498-43B3-948B-1728B52AA6E4}">
                 <adec:decorative xmlns:adec="http://schemas.microsoft.com/office/drawing/2017/decorative" val="1"/>
@@ -6907,8 +6982,8 @@
         </p:nvSpPr>
         <p:spPr>
           <a:xfrm>
-            <a:off x="0" y="638175"/>
-            <a:ext cx="12191999" cy="6219825"/>
+            <a:off x="0" y="0"/>
+            <a:ext cx="12192000" cy="6858000"/>
           </a:xfrm>
           <a:prstGeom prst="rect">
             <a:avLst/>
@@ -6944,10 +7019,49 @@
       </p:sp>
       <p:sp>
         <p:nvSpPr>
-          <p:cNvPr id="78" name="Rectangle 77">
+          <p:cNvPr id="2" name="Title 1">
             <a:extLst>
               <a:ext uri="{FF2B5EF4-FFF2-40B4-BE49-F238E27FC236}">
-                <a16:creationId xmlns:a16="http://schemas.microsoft.com/office/drawing/2014/main" id="{73B1AC31-0B6C-4781-BA06-16BE17F8AFBE}"/>
+                <a16:creationId xmlns:a16="http://schemas.microsoft.com/office/drawing/2014/main" id="{8BDCC5EB-E10C-D640-B60B-EDA92E845F05}"/>
+              </a:ext>
+            </a:extLst>
+          </p:cNvPr>
+          <p:cNvSpPr>
+            <a:spLocks noGrp="1"/>
+          </p:cNvSpPr>
+          <p:nvPr>
+            <p:ph type="ctrTitle"/>
+          </p:nvPr>
+        </p:nvSpPr>
+        <p:spPr>
+          <a:xfrm>
+            <a:off x="4801143" y="1005839"/>
+            <a:ext cx="6939304" cy="4805025"/>
+          </a:xfrm>
+        </p:spPr>
+        <p:txBody>
+          <a:bodyPr vert="horz" lIns="91440" tIns="45720" rIns="91440" bIns="45720" rtlCol="0" anchor="ctr">
+            <a:normAutofit/>
+          </a:bodyPr>
+          <a:lstStyle/>
+          <a:p>
+            <a:r>
+              <a:rPr lang="en-US" sz="6000">
+                <a:solidFill>
+                  <a:schemeClr val="tx2"/>
+                </a:solidFill>
+              </a:rPr>
+              <a:t>Predicting track success on spotify using album artwork </a:t>
+            </a:r>
+          </a:p>
+        </p:txBody>
+      </p:sp>
+      <p:sp>
+        <p:nvSpPr>
+          <p:cNvPr id="25" name="Rectangle 9">
+            <a:extLst>
+              <a:ext uri="{FF2B5EF4-FFF2-40B4-BE49-F238E27FC236}">
+                <a16:creationId xmlns:a16="http://schemas.microsoft.com/office/drawing/2014/main" id="{49B5AD54-1E68-4239-A6AF-FE0F49BB8367}"/>
               </a:ext>
               <a:ext uri="{C183D7F6-B498-43B3-948B-1728B52AA6E4}">
                 <adec:decorative xmlns:adec="http://schemas.microsoft.com/office/drawing/2017/decorative" val="1"/>
@@ -6967,8 +7081,8 @@
         </p:nvSpPr>
         <p:spPr>
           <a:xfrm>
-            <a:off x="4246851" y="723899"/>
-            <a:ext cx="7498616" cy="5666666"/>
+            <a:off x="446534" y="457200"/>
+            <a:ext cx="3703320" cy="5933365"/>
           </a:xfrm>
           <a:prstGeom prst="rect">
             <a:avLst/>
@@ -6998,61 +7112,6 @@
       </p:sp>
       <p:sp>
         <p:nvSpPr>
-          <p:cNvPr id="2" name="Title 1">
-            <a:extLst>
-              <a:ext uri="{FF2B5EF4-FFF2-40B4-BE49-F238E27FC236}">
-                <a16:creationId xmlns:a16="http://schemas.microsoft.com/office/drawing/2014/main" id="{8BDCC5EB-E10C-D640-B60B-EDA92E845F05}"/>
-              </a:ext>
-            </a:extLst>
-          </p:cNvPr>
-          <p:cNvSpPr>
-            <a:spLocks noGrp="1"/>
-          </p:cNvSpPr>
-          <p:nvPr>
-            <p:ph type="ctrTitle"/>
-          </p:nvPr>
-        </p:nvSpPr>
-        <p:spPr>
-          <a:xfrm>
-            <a:off x="4579243" y="2308225"/>
-            <a:ext cx="6798608" cy="2085869"/>
-          </a:xfrm>
-        </p:spPr>
-        <p:txBody>
-          <a:bodyPr vert="horz" lIns="91440" tIns="45720" rIns="91440" bIns="45720" rtlCol="0">
-            <a:normAutofit/>
-          </a:bodyPr>
-          <a:lstStyle/>
-          <a:p>
-            <a:r>
-              <a:rPr lang="en-US" dirty="0">
-                <a:solidFill>
-                  <a:srgbClr val="FFFFFF"/>
-                </a:solidFill>
-              </a:rPr>
-              <a:t>Predicting track success on </a:t>
-            </a:r>
-            <a:r>
-              <a:rPr lang="en-US" dirty="0" err="1">
-                <a:solidFill>
-                  <a:srgbClr val="FFFFFF"/>
-                </a:solidFill>
-              </a:rPr>
-              <a:t>spotify</a:t>
-            </a:r>
-            <a:r>
-              <a:rPr lang="en-US" dirty="0">
-                <a:solidFill>
-                  <a:srgbClr val="FFFFFF"/>
-                </a:solidFill>
-              </a:rPr>
-              <a:t> by album artwork </a:t>
-            </a:r>
-          </a:p>
-        </p:txBody>
-      </p:sp>
-      <p:sp>
-        <p:nvSpPr>
           <p:cNvPr id="3" name="Subtitle 2">
             <a:extLst>
               <a:ext uri="{FF2B5EF4-FFF2-40B4-BE49-F238E27FC236}">
@@ -7069,30 +7128,32 @@
         </p:nvSpPr>
         <p:spPr>
           <a:xfrm>
-            <a:off x="4579243" y="4394095"/>
-            <a:ext cx="6798608" cy="1733655"/>
+            <a:off x="768267" y="1009397"/>
+            <a:ext cx="3078342" cy="4801468"/>
           </a:xfrm>
         </p:spPr>
         <p:txBody>
-          <a:bodyPr vert="horz" lIns="91440" tIns="45720" rIns="91440" bIns="45720" rtlCol="0" anchor="b">
+          <a:bodyPr vert="horz" lIns="91440" tIns="45720" rIns="91440" bIns="45720" rtlCol="0" anchor="ctr">
             <a:normAutofit/>
           </a:bodyPr>
           <a:lstStyle/>
           <a:p>
-            <a:r>
-              <a:rPr lang="en-US" dirty="0">
+            <a:pPr algn="ctr"/>
+            <a:r>
+              <a:rPr lang="en-US" sz="2400">
                 <a:solidFill>
-                  <a:srgbClr val="EBEBEB"/>
+                  <a:srgbClr val="FFFFFF"/>
                 </a:solidFill>
               </a:rPr>
               <a:t>SABINA BAINS</a:t>
             </a:r>
           </a:p>
           <a:p>
-            <a:r>
-              <a:rPr lang="en-US" dirty="0">
+            <a:pPr algn="ctr"/>
+            <a:r>
+              <a:rPr lang="en-US" sz="2400">
                 <a:solidFill>
-                  <a:srgbClr val="EBEBEB"/>
+                  <a:srgbClr val="FFFFFF"/>
                 </a:solidFill>
               </a:rPr>
               <a:t>October 2022</a:t>
@@ -7110,6 +7171,209 @@
   <p:clrMapOvr>
     <a:masterClrMapping/>
   </p:clrMapOvr>
+  <p:timing>
+    <p:tnLst>
+      <p:par>
+        <p:cTn id="1" dur="indefinite" restart="never" nodeType="tmRoot">
+          <p:childTnLst>
+            <p:seq concurrent="1" nextAc="seek">
+              <p:cTn id="2" dur="indefinite" nodeType="mainSeq">
+                <p:childTnLst>
+                  <p:par>
+                    <p:cTn id="3" fill="hold">
+                      <p:stCondLst>
+                        <p:cond delay="indefinite"/>
+                        <p:cond evt="onBegin" delay="0">
+                          <p:tn val="2"/>
+                        </p:cond>
+                      </p:stCondLst>
+                      <p:childTnLst>
+                        <p:par>
+                          <p:cTn id="4" fill="hold">
+                            <p:stCondLst>
+                              <p:cond delay="0"/>
+                            </p:stCondLst>
+                            <p:childTnLst>
+                              <p:par>
+                                <p:cTn id="5" presetID="10" presetClass="entr" presetSubtype="0" fill="hold" grpId="0" nodeType="withEffect">
+                                  <p:stCondLst>
+                                    <p:cond delay="1000"/>
+                                  </p:stCondLst>
+                                  <p:iterate type="wd">
+                                    <p:tmPct val="15000"/>
+                                  </p:iterate>
+                                  <p:childTnLst>
+                                    <p:set>
+                                      <p:cBhvr>
+                                        <p:cTn id="6" dur="1" fill="hold">
+                                          <p:stCondLst>
+                                            <p:cond delay="0"/>
+                                          </p:stCondLst>
+                                        </p:cTn>
+                                        <p:tgtEl>
+                                          <p:spTgt spid="3">
+                                            <p:txEl>
+                                              <p:pRg st="0" end="0"/>
+                                            </p:txEl>
+                                          </p:spTgt>
+                                        </p:tgtEl>
+                                        <p:attrNameLst>
+                                          <p:attrName>style.visibility</p:attrName>
+                                        </p:attrNameLst>
+                                      </p:cBhvr>
+                                      <p:to>
+                                        <p:strVal val="visible"/>
+                                      </p:to>
+                                    </p:set>
+                                    <p:animEffect transition="in" filter="fade">
+                                      <p:cBhvr>
+                                        <p:cTn id="7" dur="1000"/>
+                                        <p:tgtEl>
+                                          <p:spTgt spid="3">
+                                            <p:txEl>
+                                              <p:pRg st="0" end="0"/>
+                                            </p:txEl>
+                                          </p:spTgt>
+                                        </p:tgtEl>
+                                      </p:cBhvr>
+                                    </p:animEffect>
+                                  </p:childTnLst>
+                                </p:cTn>
+                              </p:par>
+                              <p:par>
+                                <p:cTn id="8" presetID="10" presetClass="entr" presetSubtype="0" fill="hold" grpId="0" nodeType="withEffect">
+                                  <p:stCondLst>
+                                    <p:cond delay="500"/>
+                                  </p:stCondLst>
+                                  <p:iterate type="wd">
+                                    <p:tmPct val="15000"/>
+                                  </p:iterate>
+                                  <p:childTnLst>
+                                    <p:set>
+                                      <p:cBhvr>
+                                        <p:cTn id="9" dur="1" fill="hold">
+                                          <p:stCondLst>
+                                            <p:cond delay="0"/>
+                                          </p:stCondLst>
+                                        </p:cTn>
+                                        <p:tgtEl>
+                                          <p:spTgt spid="2"/>
+                                        </p:tgtEl>
+                                        <p:attrNameLst>
+                                          <p:attrName>style.visibility</p:attrName>
+                                        </p:attrNameLst>
+                                      </p:cBhvr>
+                                      <p:to>
+                                        <p:strVal val="visible"/>
+                                      </p:to>
+                                    </p:set>
+                                    <p:animEffect transition="in" filter="fade">
+                                      <p:cBhvr>
+                                        <p:cTn id="10" dur="1000"/>
+                                        <p:tgtEl>
+                                          <p:spTgt spid="2"/>
+                                        </p:tgtEl>
+                                      </p:cBhvr>
+                                    </p:animEffect>
+                                  </p:childTnLst>
+                                </p:cTn>
+                              </p:par>
+                            </p:childTnLst>
+                          </p:cTn>
+                        </p:par>
+                      </p:childTnLst>
+                    </p:cTn>
+                  </p:par>
+                  <p:par>
+                    <p:cTn id="11" fill="hold">
+                      <p:stCondLst>
+                        <p:cond delay="indefinite"/>
+                      </p:stCondLst>
+                      <p:childTnLst>
+                        <p:par>
+                          <p:cTn id="12" fill="hold">
+                            <p:stCondLst>
+                              <p:cond delay="0"/>
+                            </p:stCondLst>
+                            <p:childTnLst>
+                              <p:par>
+                                <p:cTn id="13" presetID="10" presetClass="entr" presetSubtype="0" fill="hold" grpId="0" nodeType="clickEffect">
+                                  <p:stCondLst>
+                                    <p:cond delay="1000"/>
+                                  </p:stCondLst>
+                                  <p:iterate type="wd">
+                                    <p:tmPct val="15000"/>
+                                  </p:iterate>
+                                  <p:childTnLst>
+                                    <p:set>
+                                      <p:cBhvr>
+                                        <p:cTn id="14" dur="1" fill="hold">
+                                          <p:stCondLst>
+                                            <p:cond delay="0"/>
+                                          </p:stCondLst>
+                                        </p:cTn>
+                                        <p:tgtEl>
+                                          <p:spTgt spid="3">
+                                            <p:txEl>
+                                              <p:pRg st="1" end="1"/>
+                                            </p:txEl>
+                                          </p:spTgt>
+                                        </p:tgtEl>
+                                        <p:attrNameLst>
+                                          <p:attrName>style.visibility</p:attrName>
+                                        </p:attrNameLst>
+                                      </p:cBhvr>
+                                      <p:to>
+                                        <p:strVal val="visible"/>
+                                      </p:to>
+                                    </p:set>
+                                    <p:animEffect transition="in" filter="fade">
+                                      <p:cBhvr>
+                                        <p:cTn id="15" dur="1000"/>
+                                        <p:tgtEl>
+                                          <p:spTgt spid="3">
+                                            <p:txEl>
+                                              <p:pRg st="1" end="1"/>
+                                            </p:txEl>
+                                          </p:spTgt>
+                                        </p:tgtEl>
+                                      </p:cBhvr>
+                                    </p:animEffect>
+                                  </p:childTnLst>
+                                </p:cTn>
+                              </p:par>
+                            </p:childTnLst>
+                          </p:cTn>
+                        </p:par>
+                      </p:childTnLst>
+                    </p:cTn>
+                  </p:par>
+                </p:childTnLst>
+              </p:cTn>
+              <p:prevCondLst>
+                <p:cond evt="onPrev" delay="0">
+                  <p:tgtEl>
+                    <p:sldTgt/>
+                  </p:tgtEl>
+                </p:cond>
+              </p:prevCondLst>
+              <p:nextCondLst>
+                <p:cond evt="onNext" delay="0">
+                  <p:tgtEl>
+                    <p:sldTgt/>
+                  </p:tgtEl>
+                </p:cond>
+              </p:nextCondLst>
+            </p:seq>
+          </p:childTnLst>
+        </p:cTn>
+      </p:par>
+    </p:tnLst>
+    <p:bldLst>
+      <p:bldP spid="2" grpId="0"/>
+      <p:bldP spid="3" grpId="0" build="p"/>
+    </p:bldLst>
+  </p:timing>
 </p:sld>
 </file>
 
@@ -7140,63 +7404,6 @@
       </p:grpSpPr>
       <p:sp>
         <p:nvSpPr>
-          <p:cNvPr id="71" name="Rectangle 70">
-            <a:extLst>
-              <a:ext uri="{FF2B5EF4-FFF2-40B4-BE49-F238E27FC236}">
-                <a16:creationId xmlns:a16="http://schemas.microsoft.com/office/drawing/2014/main" id="{3CED7894-4F62-4A6C-8DB5-DB5BE08E9C03}"/>
-              </a:ext>
-              <a:ext uri="{C183D7F6-B498-43B3-948B-1728B52AA6E4}">
-                <adec:decorative xmlns:adec="http://schemas.microsoft.com/office/drawing/2017/decorative" val="1"/>
-              </a:ext>
-            </a:extLst>
-          </p:cNvPr>
-          <p:cNvSpPr>
-            <a:spLocks noGrp="1" noRot="1" noChangeAspect="1" noMove="1" noResize="1" noEditPoints="1" noAdjustHandles="1" noChangeArrowheads="1" noChangeShapeType="1" noTextEdit="1"/>
-          </p:cNvSpPr>
-          <p:nvPr>
-            <p:extLst>
-              <p:ext uri="{386F3935-93C4-4BCD-93E2-E3B085C9AB24}">
-                <p16:designElem xmlns:p16="http://schemas.microsoft.com/office/powerpoint/2015/main" val="1"/>
-              </p:ext>
-            </p:extLst>
-          </p:nvPr>
-        </p:nvSpPr>
-        <p:spPr>
-          <a:xfrm>
-            <a:off x="0" y="0"/>
-            <a:ext cx="12192000" cy="6858000"/>
-          </a:xfrm>
-          <a:prstGeom prst="rect">
-            <a:avLst/>
-          </a:prstGeom>
-          <a:solidFill>
-            <a:schemeClr val="bg1">
-              <a:lumMod val="75000"/>
-              <a:lumOff val="25000"/>
-            </a:schemeClr>
-          </a:solidFill>
-          <a:ln>
-            <a:noFill/>
-          </a:ln>
-          <a:effectLst/>
-        </p:spPr>
-        <p:style>
-          <a:lnRef idx="1">
-            <a:schemeClr val="accent1"/>
-          </a:lnRef>
-          <a:fillRef idx="3">
-            <a:schemeClr val="accent1"/>
-          </a:fillRef>
-          <a:effectRef idx="2">
-            <a:schemeClr val="accent1"/>
-          </a:effectRef>
-          <a:fontRef idx="minor">
-            <a:schemeClr val="lt1"/>
-          </a:fontRef>
-        </p:style>
-      </p:sp>
-      <p:sp>
-        <p:nvSpPr>
           <p:cNvPr id="2" name="Title 1">
             <a:extLst>
               <a:ext uri="{FF2B5EF4-FFF2-40B4-BE49-F238E27FC236}">
@@ -7236,60 +7443,6 @@
       </p:sp>
       <p:sp>
         <p:nvSpPr>
-          <p:cNvPr id="73" name="Rectangle 72">
-            <a:extLst>
-              <a:ext uri="{FF2B5EF4-FFF2-40B4-BE49-F238E27FC236}">
-                <a16:creationId xmlns:a16="http://schemas.microsoft.com/office/drawing/2014/main" id="{E536F3B4-50F6-4C52-8F76-4EB1214719DC}"/>
-              </a:ext>
-              <a:ext uri="{C183D7F6-B498-43B3-948B-1728B52AA6E4}">
-                <adec:decorative xmlns:adec="http://schemas.microsoft.com/office/drawing/2017/decorative" val="1"/>
-              </a:ext>
-            </a:extLst>
-          </p:cNvPr>
-          <p:cNvSpPr>
-            <a:spLocks noGrp="1" noRot="1" noChangeAspect="1" noMove="1" noResize="1" noEditPoints="1" noAdjustHandles="1" noChangeArrowheads="1" noChangeShapeType="1" noTextEdit="1"/>
-          </p:cNvSpPr>
-          <p:nvPr>
-            <p:extLst>
-              <p:ext uri="{386F3935-93C4-4BCD-93E2-E3B085C9AB24}">
-                <p16:designElem xmlns:p16="http://schemas.microsoft.com/office/powerpoint/2015/main" val="1"/>
-              </p:ext>
-            </p:extLst>
-          </p:nvPr>
-        </p:nvSpPr>
-        <p:spPr>
-          <a:xfrm>
-            <a:off x="638620" y="457200"/>
-            <a:ext cx="3511233" cy="91439"/>
-          </a:xfrm>
-          <a:prstGeom prst="rect">
-            <a:avLst/>
-          </a:prstGeom>
-          <a:solidFill>
-            <a:schemeClr val="accent2"/>
-          </a:solidFill>
-          <a:ln>
-            <a:noFill/>
-          </a:ln>
-          <a:effectLst/>
-        </p:spPr>
-        <p:style>
-          <a:lnRef idx="1">
-            <a:schemeClr val="accent1"/>
-          </a:lnRef>
-          <a:fillRef idx="3">
-            <a:schemeClr val="accent1"/>
-          </a:fillRef>
-          <a:effectRef idx="2">
-            <a:schemeClr val="accent1"/>
-          </a:effectRef>
-          <a:fontRef idx="minor">
-            <a:schemeClr val="lt1"/>
-          </a:fontRef>
-        </p:style>
-      </p:sp>
-      <p:sp>
-        <p:nvSpPr>
           <p:cNvPr id="3" name="Content Placeholder 2">
             <a:extLst>
               <a:ext uri="{FF2B5EF4-FFF2-40B4-BE49-F238E27FC236}">
@@ -7316,15 +7469,18 @@
           </a:bodyPr>
           <a:lstStyle/>
           <a:p>
+            <a:endParaRPr lang="en-US" sz="2000" b="1" dirty="0"/>
+          </a:p>
+          <a:p>
             <a:r>
               <a:rPr lang="en-US" sz="2000" b="1" dirty="0"/>
-              <a:t>X</a:t>
+              <a:t>XX is an upcoming record label preparing to upload artists’ music to Spotify</a:t>
             </a:r>
           </a:p>
           <a:p>
             <a:r>
               <a:rPr lang="en-US" sz="2000" b="1" dirty="0"/>
-              <a:t>X</a:t>
+              <a:t> x</a:t>
             </a:r>
           </a:p>
           <a:p>
@@ -7476,7 +7632,18 @@
                   <a:schemeClr val="tx1"/>
                 </a:solidFill>
               </a:rPr>
-              <a:t>Utilize existing tracks on Spotify to train</a:t>
+              <a:t>Pull track data from ”Fresh Finds” playlists on Spotify</a:t>
+            </a:r>
+          </a:p>
+          <a:p>
+            <a:pPr lvl="1"/>
+            <a:r>
+              <a:rPr lang="en-US" sz="1400" dirty="0">
+                <a:solidFill>
+                  <a:schemeClr val="tx1"/>
+                </a:solidFill>
+              </a:rPr>
+              <a:t>Playlist consists of artists represented by lesser known labels</a:t>
             </a:r>
           </a:p>
           <a:p>
@@ -7486,7 +7653,7 @@
                   <a:schemeClr val="tx1"/>
                 </a:solidFill>
               </a:rPr>
-              <a:t>X</a:t>
+              <a:t>Analyze respective album artwork using Convolutional Neural Networks to train models</a:t>
             </a:r>
           </a:p>
           <a:p>
@@ -7496,8 +7663,15 @@
                   <a:schemeClr val="tx1"/>
                 </a:solidFill>
               </a:rPr>
-              <a:t>X</a:t>
-            </a:r>
+              <a:t>Determine if album art plays a role in track success, and if so, which album artwork is predicted to succeed on Spotify</a:t>
+            </a:r>
+          </a:p>
+          <a:p>
+            <a:endParaRPr lang="en-US" sz="2000" dirty="0">
+              <a:solidFill>
+                <a:schemeClr val="tx1"/>
+              </a:solidFill>
+            </a:endParaRPr>
           </a:p>
           <a:p>
             <a:endParaRPr lang="en-US" sz="1800" dirty="0">
@@ -7607,7 +7781,9 @@
         </p:nvSpPr>
         <p:spPr/>
         <p:txBody>
-          <a:bodyPr/>
+          <a:bodyPr>
+            <a:normAutofit/>
+          </a:bodyPr>
           <a:lstStyle/>
           <a:p>
             <a:r>
@@ -7635,15 +7811,15 @@
         </p:nvSpPr>
         <p:spPr>
           <a:xfrm>
-            <a:off x="581193" y="2180496"/>
-            <a:ext cx="5034162" cy="3678303"/>
+            <a:off x="581192" y="2180496"/>
+            <a:ext cx="5303795" cy="3786550"/>
           </a:xfrm>
         </p:spPr>
         <p:txBody>
           <a:bodyPr/>
           <a:lstStyle/>
           <a:p>
-            <a:endParaRPr lang="en-US"/>
+            <a:endParaRPr lang="en-US" dirty="0"/>
           </a:p>
         </p:txBody>
       </p:sp>
@@ -7661,8 +7837,8 @@
         </p:nvSpPr>
         <p:spPr>
           <a:xfrm>
-            <a:off x="5886387" y="2355158"/>
-            <a:ext cx="5766350" cy="3397203"/>
+            <a:off x="6095999" y="2355158"/>
+            <a:ext cx="5556737" cy="3397203"/>
           </a:xfrm>
           <a:prstGeom prst="rect">
             <a:avLst/>
@@ -7720,8 +7896,8 @@
         </p:blipFill>
         <p:spPr bwMode="auto">
           <a:xfrm>
-            <a:off x="6072554" y="2501751"/>
-            <a:ext cx="5404337" cy="3092218"/>
+            <a:off x="6283571" y="2572271"/>
+            <a:ext cx="5158154" cy="2951359"/>
           </a:xfrm>
           <a:prstGeom prst="rect">
             <a:avLst/>
@@ -7782,8 +7958,8 @@
         </p:nvSpPr>
         <p:spPr>
           <a:xfrm>
-            <a:off x="6543759" y="2520462"/>
-            <a:ext cx="5167595" cy="3505199"/>
+            <a:off x="8110493" y="2520462"/>
+            <a:ext cx="3556000" cy="3505199"/>
           </a:xfrm>
           <a:prstGeom prst="rect">
             <a:avLst/>
@@ -7810,10 +7986,7 @@
           <a:lstStyle/>
           <a:p>
             <a:pPr algn="ctr"/>
-            <a:r>
-              <a:rPr lang="en-US" dirty="0"/>
-              <a:t>Put album example here with axes to show pixels. </a:t>
-            </a:r>
+            <a:endParaRPr lang="en-US" dirty="0"/>
           </a:p>
         </p:txBody>
       </p:sp>
@@ -7942,7 +8115,7 @@
             </a:r>
             <a:r>
               <a:rPr lang="en-US" sz="2000" b="1" dirty="0"/>
-              <a:t>of 1,000 tracks on Spotify’s “Fresh Finds” playlists, which highlights new independent artists</a:t>
+              <a:t>of 1,000 tracks on Spotify’s “Fresh Finds” playlists, which highlights artists on independent labels</a:t>
             </a:r>
           </a:p>
           <a:p>
@@ -7982,7 +8155,7 @@
             </a:pPr>
             <a:r>
               <a:rPr lang="en-US" sz="2000" dirty="0"/>
-              <a:t>Album artwork is condensed into numbers to be inputted into a model. </a:t>
+              <a:t>Album artwork is condensed into numbers to be read into a model. </a:t>
             </a:r>
             <a:endParaRPr lang="en-US" dirty="0"/>
           </a:p>
@@ -8079,8 +8252,8 @@
         </p:nvSpPr>
         <p:spPr>
           <a:xfrm>
-            <a:off x="7035414" y="1989649"/>
-            <a:ext cx="4083738" cy="523220"/>
+            <a:off x="8110492" y="1988711"/>
+            <a:ext cx="3617545" cy="523220"/>
           </a:xfrm>
           <a:prstGeom prst="rect">
             <a:avLst/>
@@ -8096,11 +8269,58 @@
             <a:pPr algn="ctr"/>
             <a:r>
               <a:rPr lang="en-US" sz="1400" dirty="0"/>
-              <a:t>Frequency Distribution Of Top Words Used in Cyberbullying Tweets</a:t>
+              <a:t>Album artwork example pulled from Spotify’s new artist playlist</a:t>
             </a:r>
           </a:p>
         </p:txBody>
       </p:sp>
+      <p:pic>
+        <p:nvPicPr>
+          <p:cNvPr id="2052" name="Picture 4">
+            <a:extLst>
+              <a:ext uri="{FF2B5EF4-FFF2-40B4-BE49-F238E27FC236}">
+                <a16:creationId xmlns:a16="http://schemas.microsoft.com/office/drawing/2014/main" id="{5F59B826-89F0-C640-915D-2CC423C2D8A7}"/>
+              </a:ext>
+            </a:extLst>
+          </p:cNvPr>
+          <p:cNvPicPr>
+            <a:picLocks noChangeAspect="1" noChangeArrowheads="1"/>
+          </p:cNvPicPr>
+          <p:nvPr/>
+        </p:nvPicPr>
+        <p:blipFill>
+          <a:blip r:embed="rId2">
+            <a:extLst>
+              <a:ext uri="{28A0092B-C50C-407E-A947-70E740481C1C}">
+                <a14:useLocalDpi xmlns:a14="http://schemas.microsoft.com/office/drawing/2010/main" val="0"/>
+              </a:ext>
+            </a:extLst>
+          </a:blip>
+          <a:srcRect/>
+          <a:stretch>
+            <a:fillRect/>
+          </a:stretch>
+        </p:blipFill>
+        <p:spPr bwMode="auto">
+          <a:xfrm>
+            <a:off x="8169108" y="2588846"/>
+            <a:ext cx="3441700" cy="3378200"/>
+          </a:xfrm>
+          <a:prstGeom prst="rect">
+            <a:avLst/>
+          </a:prstGeom>
+          <a:noFill/>
+          <a:extLst>
+            <a:ext uri="{909E8E84-426E-40DD-AFC4-6F175D3DCCD1}">
+              <a14:hiddenFill xmlns:a14="http://schemas.microsoft.com/office/drawing/2010/main">
+                <a:solidFill>
+                  <a:srgbClr val="FFFFFF"/>
+                </a:solidFill>
+              </a14:hiddenFill>
+            </a:ext>
+          </a:extLst>
+        </p:spPr>
+      </p:pic>
     </p:spTree>
     <p:extLst>
       <p:ext uri="{BB962C8B-B14F-4D97-AF65-F5344CB8AC3E}">
@@ -8146,7 +8366,7 @@
         <p:spPr>
           <a:xfrm>
             <a:off x="794239" y="2660573"/>
-            <a:ext cx="4199791" cy="3565606"/>
+            <a:ext cx="3848099" cy="3565606"/>
           </a:xfrm>
           <a:prstGeom prst="rect">
             <a:avLst/>
@@ -8173,10 +8393,7 @@
           <a:lstStyle/>
           <a:p>
             <a:pPr algn="ctr"/>
-            <a:r>
-              <a:rPr lang="en-US" dirty="0"/>
-              <a:t>Put scatterplot here of true vs. predicted. </a:t>
-            </a:r>
+            <a:endParaRPr lang="en-US" dirty="0"/>
           </a:p>
         </p:txBody>
       </p:sp>
@@ -8196,12 +8413,7 @@
             <p:ph type="title"/>
           </p:nvPr>
         </p:nvSpPr>
-        <p:spPr>
-          <a:xfrm>
-            <a:off x="581192" y="702156"/>
-            <a:ext cx="11029616" cy="1013800"/>
-          </a:xfrm>
-        </p:spPr>
+        <p:spPr/>
         <p:txBody>
           <a:bodyPr>
             <a:normAutofit/>
@@ -8259,21 +8471,18 @@
             </a:r>
             <a:r>
               <a:rPr lang="en-US" b="1" dirty="0"/>
-              <a:t>was within a 10 point threshold of predicting popularity 68% </a:t>
+              <a:t>was within a 5 point threshold of predicting popularity only 25% </a:t>
             </a:r>
             <a:r>
               <a:rPr lang="en-US" dirty="0"/>
-              <a:t>of the time</a:t>
+              <a:t>of the time.</a:t>
             </a:r>
           </a:p>
           <a:p>
             <a:endParaRPr lang="en-US" dirty="0"/>
           </a:p>
           <a:p>
-            <a:r>
-              <a:rPr lang="en-US" dirty="0"/>
-              <a:t>The model was vastly more efficient when taking genre into consideration</a:t>
-            </a:r>
+            <a:endParaRPr lang="en-US" dirty="0"/>
           </a:p>
         </p:txBody>
       </p:sp>
@@ -8495,7 +8704,7 @@
             <a:pPr algn="ctr"/>
             <a:r>
               <a:rPr lang="en-US" sz="1600" dirty="0"/>
-              <a:t>Matrix of True and Predicted Values</a:t>
+              <a:t>Scatterplot of True vs. Predicted Values</a:t>
             </a:r>
           </a:p>
         </p:txBody>
@@ -8534,6 +8743,53 @@
           </a:p>
         </p:txBody>
       </p:sp>
+      <p:pic>
+        <p:nvPicPr>
+          <p:cNvPr id="1026" name="Picture 2">
+            <a:extLst>
+              <a:ext uri="{FF2B5EF4-FFF2-40B4-BE49-F238E27FC236}">
+                <a16:creationId xmlns:a16="http://schemas.microsoft.com/office/drawing/2014/main" id="{D47ABD9E-9FC8-DE49-B67D-E19D18C4F4AE}"/>
+              </a:ext>
+            </a:extLst>
+          </p:cNvPr>
+          <p:cNvPicPr>
+            <a:picLocks noChangeAspect="1" noChangeArrowheads="1"/>
+          </p:cNvPicPr>
+          <p:nvPr/>
+        </p:nvPicPr>
+        <p:blipFill>
+          <a:blip r:embed="rId2">
+            <a:extLst>
+              <a:ext uri="{28A0092B-C50C-407E-A947-70E740481C1C}">
+                <a14:useLocalDpi xmlns:a14="http://schemas.microsoft.com/office/drawing/2010/main" val="0"/>
+              </a:ext>
+            </a:extLst>
+          </a:blip>
+          <a:srcRect/>
+          <a:stretch>
+            <a:fillRect/>
+          </a:stretch>
+        </p:blipFill>
+        <p:spPr bwMode="auto">
+          <a:xfrm>
+            <a:off x="844426" y="2696941"/>
+            <a:ext cx="3660530" cy="3528619"/>
+          </a:xfrm>
+          <a:prstGeom prst="rect">
+            <a:avLst/>
+          </a:prstGeom>
+          <a:noFill/>
+          <a:extLst>
+            <a:ext uri="{909E8E84-426E-40DD-AFC4-6F175D3DCCD1}">
+              <a14:hiddenFill xmlns:a14="http://schemas.microsoft.com/office/drawing/2010/main">
+                <a:solidFill>
+                  <a:srgbClr val="FFFFFF"/>
+                </a:solidFill>
+              </a14:hiddenFill>
+            </a:ext>
+          </a:extLst>
+        </p:spPr>
+      </p:pic>
     </p:spTree>
     <p:extLst>
       <p:ext uri="{BB962C8B-B14F-4D97-AF65-F5344CB8AC3E}">
@@ -8588,12 +8844,7 @@
             <p:ph type="title"/>
           </p:nvPr>
         </p:nvSpPr>
-        <p:spPr>
-          <a:xfrm>
-            <a:off x="581192" y="702156"/>
-            <a:ext cx="11029616" cy="1013800"/>
-          </a:xfrm>
-        </p:spPr>
+        <p:spPr/>
         <p:txBody>
           <a:bodyPr>
             <a:normAutofit/>
@@ -8627,7 +8878,7 @@
             <p:ph idx="1"/>
             <p:extLst>
               <p:ext uri="{D42A27DB-BD31-4B8C-83A1-F6EECF244321}">
-                <p14:modId xmlns:p14="http://schemas.microsoft.com/office/powerpoint/2010/main" val="2223724701"/>
+                <p14:modId xmlns:p14="http://schemas.microsoft.com/office/powerpoint/2010/main" val="707234243"/>
               </p:ext>
             </p:extLst>
           </p:nvPr>
@@ -8738,336 +8989,6 @@
           <a:chExt cx="0" cy="0"/>
         </a:xfrm>
       </p:grpSpPr>
-      <p:sp>
-        <p:nvSpPr>
-          <p:cNvPr id="17" name="Rectangle 9">
-            <a:extLst>
-              <a:ext uri="{FF2B5EF4-FFF2-40B4-BE49-F238E27FC236}">
-                <a16:creationId xmlns:a16="http://schemas.microsoft.com/office/drawing/2014/main" id="{DB691D59-8F51-4DD8-AD41-D568D29B08F8}"/>
-              </a:ext>
-              <a:ext uri="{C183D7F6-B498-43B3-948B-1728B52AA6E4}">
-                <adec:decorative xmlns:adec="http://schemas.microsoft.com/office/drawing/2017/decorative" val="1"/>
-              </a:ext>
-            </a:extLst>
-          </p:cNvPr>
-          <p:cNvSpPr>
-            <a:spLocks noGrp="1" noRot="1" noChangeAspect="1" noMove="1" noResize="1" noEditPoints="1" noAdjustHandles="1" noChangeArrowheads="1" noChangeShapeType="1" noTextEdit="1"/>
-          </p:cNvSpPr>
-          <p:nvPr>
-            <p:extLst>
-              <p:ext uri="{386F3935-93C4-4BCD-93E2-E3B085C9AB24}">
-                <p16:designElem xmlns:p16="http://schemas.microsoft.com/office/powerpoint/2015/main" val="1"/>
-              </p:ext>
-            </p:extLst>
-          </p:nvPr>
-        </p:nvSpPr>
-        <p:spPr>
-          <a:xfrm>
-            <a:off x="446534" y="457200"/>
-            <a:ext cx="3703320" cy="94997"/>
-          </a:xfrm>
-          <a:prstGeom prst="rect">
-            <a:avLst/>
-          </a:prstGeom>
-          <a:solidFill>
-            <a:schemeClr val="accent1"/>
-          </a:solidFill>
-          <a:ln>
-            <a:noFill/>
-          </a:ln>
-          <a:effectLst/>
-        </p:spPr>
-        <p:style>
-          <a:lnRef idx="1">
-            <a:schemeClr val="accent1"/>
-          </a:lnRef>
-          <a:fillRef idx="3">
-            <a:schemeClr val="accent1"/>
-          </a:fillRef>
-          <a:effectRef idx="2">
-            <a:schemeClr val="accent1"/>
-          </a:effectRef>
-          <a:fontRef idx="minor">
-            <a:schemeClr val="lt1"/>
-          </a:fontRef>
-        </p:style>
-      </p:sp>
-      <p:sp>
-        <p:nvSpPr>
-          <p:cNvPr id="19" name="Rectangle 11">
-            <a:extLst>
-              <a:ext uri="{FF2B5EF4-FFF2-40B4-BE49-F238E27FC236}">
-                <a16:creationId xmlns:a16="http://schemas.microsoft.com/office/drawing/2014/main" id="{204AEF18-0627-48F3-9B3D-F7E8F050B1D4}"/>
-              </a:ext>
-              <a:ext uri="{C183D7F6-B498-43B3-948B-1728B52AA6E4}">
-                <adec:decorative xmlns:adec="http://schemas.microsoft.com/office/drawing/2017/decorative" val="1"/>
-              </a:ext>
-            </a:extLst>
-          </p:cNvPr>
-          <p:cNvSpPr>
-            <a:spLocks noGrp="1" noRot="1" noChangeAspect="1" noMove="1" noResize="1" noEditPoints="1" noAdjustHandles="1" noChangeArrowheads="1" noChangeShapeType="1" noTextEdit="1"/>
-          </p:cNvSpPr>
-          <p:nvPr>
-            <p:extLst>
-              <p:ext uri="{386F3935-93C4-4BCD-93E2-E3B085C9AB24}">
-                <p16:designElem xmlns:p16="http://schemas.microsoft.com/office/powerpoint/2015/main" val="1"/>
-              </p:ext>
-            </p:extLst>
-          </p:nvPr>
-        </p:nvSpPr>
-        <p:spPr>
-          <a:xfrm>
-            <a:off x="8042147" y="453643"/>
-            <a:ext cx="3703320" cy="98554"/>
-          </a:xfrm>
-          <a:prstGeom prst="rect">
-            <a:avLst/>
-          </a:prstGeom>
-          <a:solidFill>
-            <a:schemeClr val="accent4"/>
-          </a:solidFill>
-          <a:ln>
-            <a:noFill/>
-          </a:ln>
-          <a:effectLst/>
-        </p:spPr>
-        <p:style>
-          <a:lnRef idx="1">
-            <a:schemeClr val="accent1"/>
-          </a:lnRef>
-          <a:fillRef idx="3">
-            <a:schemeClr val="accent1"/>
-          </a:fillRef>
-          <a:effectRef idx="2">
-            <a:schemeClr val="accent1"/>
-          </a:effectRef>
-          <a:fontRef idx="minor">
-            <a:schemeClr val="lt1"/>
-          </a:fontRef>
-        </p:style>
-      </p:sp>
-      <p:sp>
-        <p:nvSpPr>
-          <p:cNvPr id="21" name="Rectangle 13">
-            <a:extLst>
-              <a:ext uri="{FF2B5EF4-FFF2-40B4-BE49-F238E27FC236}">
-                <a16:creationId xmlns:a16="http://schemas.microsoft.com/office/drawing/2014/main" id="{CEAEE08A-C572-438F-9753-B0D527A515A7}"/>
-              </a:ext>
-              <a:ext uri="{C183D7F6-B498-43B3-948B-1728B52AA6E4}">
-                <adec:decorative xmlns:adec="http://schemas.microsoft.com/office/drawing/2017/decorative" val="1"/>
-              </a:ext>
-            </a:extLst>
-          </p:cNvPr>
-          <p:cNvSpPr>
-            <a:spLocks noGrp="1" noRot="1" noChangeAspect="1" noMove="1" noResize="1" noEditPoints="1" noAdjustHandles="1" noChangeArrowheads="1" noChangeShapeType="1" noTextEdit="1"/>
-          </p:cNvSpPr>
-          <p:nvPr>
-            <p:extLst>
-              <p:ext uri="{386F3935-93C4-4BCD-93E2-E3B085C9AB24}">
-                <p16:designElem xmlns:p16="http://schemas.microsoft.com/office/powerpoint/2015/main" val="1"/>
-              </p:ext>
-            </p:extLst>
-          </p:nvPr>
-        </p:nvSpPr>
-        <p:spPr>
-          <a:xfrm>
-            <a:off x="4241830" y="457200"/>
-            <a:ext cx="3703320" cy="91440"/>
-          </a:xfrm>
-          <a:prstGeom prst="rect">
-            <a:avLst/>
-          </a:prstGeom>
-          <a:solidFill>
-            <a:schemeClr val="accent2"/>
-          </a:solidFill>
-          <a:ln>
-            <a:noFill/>
-          </a:ln>
-          <a:effectLst/>
-        </p:spPr>
-        <p:style>
-          <a:lnRef idx="1">
-            <a:schemeClr val="accent1"/>
-          </a:lnRef>
-          <a:fillRef idx="3">
-            <a:schemeClr val="accent1"/>
-          </a:fillRef>
-          <a:effectRef idx="2">
-            <a:schemeClr val="accent1"/>
-          </a:effectRef>
-          <a:fontRef idx="minor">
-            <a:schemeClr val="lt1"/>
-          </a:fontRef>
-        </p:style>
-      </p:sp>
-      <p:sp>
-        <p:nvSpPr>
-          <p:cNvPr id="16" name="Rectangle 15">
-            <a:extLst>
-              <a:ext uri="{FF2B5EF4-FFF2-40B4-BE49-F238E27FC236}">
-                <a16:creationId xmlns:a16="http://schemas.microsoft.com/office/drawing/2014/main" id="{DB93146F-62ED-4C59-844C-0935D0FB5031}"/>
-              </a:ext>
-              <a:ext uri="{C183D7F6-B498-43B3-948B-1728B52AA6E4}">
-                <adec:decorative xmlns:adec="http://schemas.microsoft.com/office/drawing/2017/decorative" val="1"/>
-              </a:ext>
-            </a:extLst>
-          </p:cNvPr>
-          <p:cNvSpPr>
-            <a:spLocks noGrp="1" noRot="1" noChangeAspect="1" noMove="1" noResize="1" noEditPoints="1" noAdjustHandles="1" noChangeArrowheads="1" noChangeShapeType="1" noTextEdit="1"/>
-          </p:cNvSpPr>
-          <p:nvPr>
-            <p:extLst>
-              <p:ext uri="{386F3935-93C4-4BCD-93E2-E3B085C9AB24}">
-                <p16:designElem xmlns:p16="http://schemas.microsoft.com/office/powerpoint/2015/main" val="1"/>
-              </p:ext>
-            </p:extLst>
-          </p:nvPr>
-        </p:nvSpPr>
-        <p:spPr>
-          <a:xfrm>
-            <a:off x="446534" y="3085765"/>
-            <a:ext cx="11262866" cy="3304800"/>
-          </a:xfrm>
-          <a:prstGeom prst="rect">
-            <a:avLst/>
-          </a:prstGeom>
-          <a:solidFill>
-            <a:schemeClr val="accent1"/>
-          </a:solidFill>
-          <a:ln>
-            <a:noFill/>
-          </a:ln>
-          <a:effectLst/>
-        </p:spPr>
-        <p:style>
-          <a:lnRef idx="1">
-            <a:schemeClr val="accent1"/>
-          </a:lnRef>
-          <a:fillRef idx="3">
-            <a:schemeClr val="accent1"/>
-          </a:fillRef>
-          <a:effectRef idx="2">
-            <a:schemeClr val="accent1"/>
-          </a:effectRef>
-          <a:fontRef idx="minor">
-            <a:schemeClr val="lt1"/>
-          </a:fontRef>
-        </p:style>
-      </p:sp>
-      <p:sp useBgFill="1">
-        <p:nvSpPr>
-          <p:cNvPr id="18" name="Rectangle 17">
-            <a:extLst>
-              <a:ext uri="{FF2B5EF4-FFF2-40B4-BE49-F238E27FC236}">
-                <a16:creationId xmlns:a16="http://schemas.microsoft.com/office/drawing/2014/main" id="{B5D795CF-5F70-4821-BB11-0B2B8FCCD45A}"/>
-              </a:ext>
-              <a:ext uri="{C183D7F6-B498-43B3-948B-1728B52AA6E4}">
-                <adec:decorative xmlns:adec="http://schemas.microsoft.com/office/drawing/2017/decorative" val="1"/>
-              </a:ext>
-            </a:extLst>
-          </p:cNvPr>
-          <p:cNvSpPr>
-            <a:spLocks noGrp="1" noRot="1" noChangeAspect="1" noMove="1" noResize="1" noEditPoints="1" noAdjustHandles="1" noChangeArrowheads="1" noChangeShapeType="1" noTextEdit="1"/>
-          </p:cNvSpPr>
-          <p:nvPr>
-            <p:extLst>
-              <p:ext uri="{386F3935-93C4-4BCD-93E2-E3B085C9AB24}">
-                <p16:designElem xmlns:p16="http://schemas.microsoft.com/office/powerpoint/2015/main" val="1"/>
-              </p:ext>
-            </p:extLst>
-          </p:nvPr>
-        </p:nvSpPr>
-        <p:spPr>
-          <a:xfrm>
-            <a:off x="0" y="638175"/>
-            <a:ext cx="12191999" cy="6219825"/>
-          </a:xfrm>
-          <a:prstGeom prst="rect">
-            <a:avLst/>
-          </a:prstGeom>
-          <a:ln>
-            <a:noFill/>
-          </a:ln>
-        </p:spPr>
-        <p:style>
-          <a:lnRef idx="2">
-            <a:schemeClr val="accent1">
-              <a:shade val="50000"/>
-            </a:schemeClr>
-          </a:lnRef>
-          <a:fillRef idx="1">
-            <a:schemeClr val="accent1"/>
-          </a:fillRef>
-          <a:effectRef idx="0">
-            <a:schemeClr val="accent1"/>
-          </a:effectRef>
-          <a:fontRef idx="minor">
-            <a:schemeClr val="lt1"/>
-          </a:fontRef>
-        </p:style>
-        <p:txBody>
-          <a:bodyPr rtlCol="0" anchor="ctr"/>
-          <a:lstStyle/>
-          <a:p>
-            <a:pPr algn="ctr"/>
-            <a:endParaRPr lang="en-US"/>
-          </a:p>
-        </p:txBody>
-      </p:sp>
-      <p:sp>
-        <p:nvSpPr>
-          <p:cNvPr id="20" name="Rectangle 19">
-            <a:extLst>
-              <a:ext uri="{FF2B5EF4-FFF2-40B4-BE49-F238E27FC236}">
-                <a16:creationId xmlns:a16="http://schemas.microsoft.com/office/drawing/2014/main" id="{73B1AC31-0B6C-4781-BA06-16BE17F8AFBE}"/>
-              </a:ext>
-              <a:ext uri="{C183D7F6-B498-43B3-948B-1728B52AA6E4}">
-                <adec:decorative xmlns:adec="http://schemas.microsoft.com/office/drawing/2017/decorative" val="1"/>
-              </a:ext>
-            </a:extLst>
-          </p:cNvPr>
-          <p:cNvSpPr>
-            <a:spLocks noGrp="1" noRot="1" noChangeAspect="1" noMove="1" noResize="1" noEditPoints="1" noAdjustHandles="1" noChangeArrowheads="1" noChangeShapeType="1" noTextEdit="1"/>
-          </p:cNvSpPr>
-          <p:nvPr>
-            <p:extLst>
-              <p:ext uri="{386F3935-93C4-4BCD-93E2-E3B085C9AB24}">
-                <p16:designElem xmlns:p16="http://schemas.microsoft.com/office/powerpoint/2015/main" val="1"/>
-              </p:ext>
-            </p:extLst>
-          </p:nvPr>
-        </p:nvSpPr>
-        <p:spPr>
-          <a:xfrm>
-            <a:off x="4246851" y="723899"/>
-            <a:ext cx="7498616" cy="5666666"/>
-          </a:xfrm>
-          <a:prstGeom prst="rect">
-            <a:avLst/>
-          </a:prstGeom>
-          <a:solidFill>
-            <a:schemeClr val="accent1"/>
-          </a:solidFill>
-          <a:ln>
-            <a:noFill/>
-          </a:ln>
-          <a:effectLst/>
-        </p:spPr>
-        <p:style>
-          <a:lnRef idx="1">
-            <a:schemeClr val="accent1"/>
-          </a:lnRef>
-          <a:fillRef idx="3">
-            <a:schemeClr val="accent1"/>
-          </a:fillRef>
-          <a:effectRef idx="2">
-            <a:schemeClr val="accent1"/>
-          </a:effectRef>
-          <a:fontRef idx="minor">
-            <a:schemeClr val="lt1"/>
-          </a:fontRef>
-        </p:style>
-      </p:sp>
       <p:sp>
         <p:nvSpPr>
           <p:cNvPr id="2" name="Title 1">

</xml_diff>